<commit_message>
Add the parse for "fonction" and "retourne"
</commit_message>
<xml_diff>
--- a/doc/Présentation_SoireePartenaireEMK.pptx
+++ b/doc/Présentation_SoireePartenaireEMK.pptx
@@ -5,14 +5,17 @@
     <p:sldMasterId id="2147483660" r:id="rId1"/>
   </p:sldMasterIdLst>
   <p:notesMasterIdLst>
-    <p:notesMasterId r:id="rId7"/>
+    <p:notesMasterId r:id="rId10"/>
   </p:notesMasterIdLst>
   <p:sldIdLst>
     <p:sldId id="282" r:id="rId2"/>
     <p:sldId id="283" r:id="rId3"/>
     <p:sldId id="284" r:id="rId4"/>
     <p:sldId id="285" r:id="rId5"/>
-    <p:sldId id="286" r:id="rId6"/>
+    <p:sldId id="287" r:id="rId6"/>
+    <p:sldId id="288" r:id="rId7"/>
+    <p:sldId id="289" r:id="rId8"/>
+    <p:sldId id="286" r:id="rId9"/>
   </p:sldIdLst>
   <p:sldSz cx="9144000" cy="6858000" type="screen4x3"/>
   <p:notesSz cx="6858000" cy="9144000"/>
@@ -113,7 +116,7 @@
   </p:defaultTextStyle>
   <p:extLst>
     <p:ext uri="{EFAFB233-063F-42B5-8137-9DF3F51BA10A}">
-      <p15:sldGuideLst xmlns="" xmlns:p15="http://schemas.microsoft.com/office/powerpoint/2012/main">
+      <p15:sldGuideLst xmlns:p15="http://schemas.microsoft.com/office/powerpoint/2012/main">
         <p15:guide id="1" orient="horz" pos="2160">
           <p15:clr>
             <a:srgbClr val="A4A3A4"/>
@@ -212,7 +215,7 @@
           <a:p>
             <a:fld id="{8321BC6A-369C-604A-8F23-8CDF9D2A8481}" type="datetimeFigureOut">
               <a:rPr lang="fr-FR" smtClean="0"/>
-              <a:t>03/02/19</a:t>
+              <a:t>07/03/2019</a:t>
             </a:fld>
             <a:endParaRPr lang="fr-FR"/>
           </a:p>
@@ -276,38 +279,37 @@
           <a:p>
             <a:pPr lvl="0"/>
             <a:r>
-              <a:rPr lang="fr-FR" smtClean="0"/>
+              <a:rPr lang="fr-FR"/>
               <a:t>Cliquez pour modifier les styles du texte du masque</a:t>
             </a:r>
           </a:p>
           <a:p>
             <a:pPr lvl="1"/>
             <a:r>
-              <a:rPr lang="fr-FR" smtClean="0"/>
+              <a:rPr lang="fr-FR"/>
               <a:t>Deuxième niveau</a:t>
             </a:r>
           </a:p>
           <a:p>
             <a:pPr lvl="2"/>
             <a:r>
-              <a:rPr lang="fr-FR" smtClean="0"/>
+              <a:rPr lang="fr-FR"/>
               <a:t>Troisième niveau</a:t>
             </a:r>
           </a:p>
           <a:p>
             <a:pPr lvl="3"/>
             <a:r>
-              <a:rPr lang="fr-FR" smtClean="0"/>
+              <a:rPr lang="fr-FR"/>
               <a:t>Quatrième niveau</a:t>
             </a:r>
           </a:p>
           <a:p>
             <a:pPr lvl="4"/>
             <a:r>
-              <a:rPr lang="fr-FR" smtClean="0"/>
+              <a:rPr lang="fr-FR"/>
               <a:t>Cinquième niveau</a:t>
             </a:r>
-            <a:endParaRPr lang="fr-FR"/>
           </a:p>
         </p:txBody>
       </p:sp>
@@ -842,6 +844,285 @@
     </p:spTree>
     <p:extLst>
       <p:ext uri="{BB962C8B-B14F-4D97-AF65-F5344CB8AC3E}">
+        <p14:creationId xmlns:p14="http://schemas.microsoft.com/office/powerpoint/2010/main" val="1358277374"/>
+      </p:ext>
+    </p:extLst>
+  </p:cSld>
+  <p:clrMapOvr>
+    <a:masterClrMapping/>
+  </p:clrMapOvr>
+</p:notes>
+</file>
+
+<file path=ppt/notesSlides/notesSlide5.xml><?xml version="1.0" encoding="utf-8"?>
+<p:notes xmlns:a="http://schemas.openxmlformats.org/drawingml/2006/main" xmlns:r="http://schemas.openxmlformats.org/officeDocument/2006/relationships" xmlns:p="http://schemas.openxmlformats.org/presentationml/2006/main">
+  <p:cSld>
+    <p:spTree>
+      <p:nvGrpSpPr>
+        <p:cNvPr id="1" name=""/>
+        <p:cNvGrpSpPr/>
+        <p:nvPr/>
+      </p:nvGrpSpPr>
+      <p:grpSpPr>
+        <a:xfrm>
+          <a:off x="0" y="0"/>
+          <a:ext cx="0" cy="0"/>
+          <a:chOff x="0" y="0"/>
+          <a:chExt cx="0" cy="0"/>
+        </a:xfrm>
+      </p:grpSpPr>
+      <p:sp>
+        <p:nvSpPr>
+          <p:cNvPr id="2" name="Espace réservé de l’image des diapositives 1"/>
+          <p:cNvSpPr>
+            <a:spLocks noGrp="1" noRot="1" noChangeAspect="1"/>
+          </p:cNvSpPr>
+          <p:nvPr>
+            <p:ph type="sldImg"/>
+          </p:nvPr>
+        </p:nvSpPr>
+        <p:spPr/>
+      </p:sp>
+      <p:sp>
+        <p:nvSpPr>
+          <p:cNvPr id="3" name="Espace réservé des commentaires 2"/>
+          <p:cNvSpPr>
+            <a:spLocks noGrp="1"/>
+          </p:cNvSpPr>
+          <p:nvPr>
+            <p:ph type="body" idx="1"/>
+          </p:nvPr>
+        </p:nvSpPr>
+        <p:spPr/>
+        <p:txBody>
+          <a:bodyPr/>
+          <a:lstStyle/>
+          <a:p>
+            <a:endParaRPr lang="fr-FR" dirty="0"/>
+          </a:p>
+        </p:txBody>
+      </p:sp>
+      <p:sp>
+        <p:nvSpPr>
+          <p:cNvPr id="4" name="Espace réservé du numéro de diapositive 3"/>
+          <p:cNvSpPr>
+            <a:spLocks noGrp="1"/>
+          </p:cNvSpPr>
+          <p:nvPr>
+            <p:ph type="sldNum" sz="quarter" idx="10"/>
+          </p:nvPr>
+        </p:nvSpPr>
+        <p:spPr/>
+        <p:txBody>
+          <a:bodyPr/>
+          <a:lstStyle/>
+          <a:p>
+            <a:fld id="{B3CC542E-CDD7-514E-B6A9-FB58F1235490}" type="slidenum">
+              <a:rPr lang="fr-FR" smtClean="0">
+                <a:solidFill>
+                  <a:prstClr val="black"/>
+                </a:solidFill>
+              </a:rPr>
+              <a:pPr/>
+              <a:t>6</a:t>
+            </a:fld>
+            <a:endParaRPr lang="fr-FR">
+              <a:solidFill>
+                <a:prstClr val="black"/>
+              </a:solidFill>
+            </a:endParaRPr>
+          </a:p>
+        </p:txBody>
+      </p:sp>
+    </p:spTree>
+    <p:extLst>
+      <p:ext uri="{BB962C8B-B14F-4D97-AF65-F5344CB8AC3E}">
+        <p14:creationId xmlns:p14="http://schemas.microsoft.com/office/powerpoint/2010/main" val="4286132397"/>
+      </p:ext>
+    </p:extLst>
+  </p:cSld>
+  <p:clrMapOvr>
+    <a:masterClrMapping/>
+  </p:clrMapOvr>
+</p:notes>
+</file>
+
+<file path=ppt/notesSlides/notesSlide6.xml><?xml version="1.0" encoding="utf-8"?>
+<p:notes xmlns:a="http://schemas.openxmlformats.org/drawingml/2006/main" xmlns:r="http://schemas.openxmlformats.org/officeDocument/2006/relationships" xmlns:p="http://schemas.openxmlformats.org/presentationml/2006/main">
+  <p:cSld>
+    <p:spTree>
+      <p:nvGrpSpPr>
+        <p:cNvPr id="1" name=""/>
+        <p:cNvGrpSpPr/>
+        <p:nvPr/>
+      </p:nvGrpSpPr>
+      <p:grpSpPr>
+        <a:xfrm>
+          <a:off x="0" y="0"/>
+          <a:ext cx="0" cy="0"/>
+          <a:chOff x="0" y="0"/>
+          <a:chExt cx="0" cy="0"/>
+        </a:xfrm>
+      </p:grpSpPr>
+      <p:sp>
+        <p:nvSpPr>
+          <p:cNvPr id="2" name="Espace réservé de l’image des diapositives 1"/>
+          <p:cNvSpPr>
+            <a:spLocks noGrp="1" noRot="1" noChangeAspect="1"/>
+          </p:cNvSpPr>
+          <p:nvPr>
+            <p:ph type="sldImg"/>
+          </p:nvPr>
+        </p:nvSpPr>
+        <p:spPr/>
+      </p:sp>
+      <p:sp>
+        <p:nvSpPr>
+          <p:cNvPr id="3" name="Espace réservé des commentaires 2"/>
+          <p:cNvSpPr>
+            <a:spLocks noGrp="1"/>
+          </p:cNvSpPr>
+          <p:nvPr>
+            <p:ph type="body" idx="1"/>
+          </p:nvPr>
+        </p:nvSpPr>
+        <p:spPr/>
+        <p:txBody>
+          <a:bodyPr/>
+          <a:lstStyle/>
+          <a:p>
+            <a:endParaRPr lang="fr-FR" dirty="0"/>
+          </a:p>
+        </p:txBody>
+      </p:sp>
+      <p:sp>
+        <p:nvSpPr>
+          <p:cNvPr id="4" name="Espace réservé du numéro de diapositive 3"/>
+          <p:cNvSpPr>
+            <a:spLocks noGrp="1"/>
+          </p:cNvSpPr>
+          <p:nvPr>
+            <p:ph type="sldNum" sz="quarter" idx="10"/>
+          </p:nvPr>
+        </p:nvSpPr>
+        <p:spPr/>
+        <p:txBody>
+          <a:bodyPr/>
+          <a:lstStyle/>
+          <a:p>
+            <a:fld id="{B3CC542E-CDD7-514E-B6A9-FB58F1235490}" type="slidenum">
+              <a:rPr lang="fr-FR" smtClean="0">
+                <a:solidFill>
+                  <a:prstClr val="black"/>
+                </a:solidFill>
+              </a:rPr>
+              <a:pPr/>
+              <a:t>7</a:t>
+            </a:fld>
+            <a:endParaRPr lang="fr-FR">
+              <a:solidFill>
+                <a:prstClr val="black"/>
+              </a:solidFill>
+            </a:endParaRPr>
+          </a:p>
+        </p:txBody>
+      </p:sp>
+    </p:spTree>
+    <p:extLst>
+      <p:ext uri="{BB962C8B-B14F-4D97-AF65-F5344CB8AC3E}">
+        <p14:creationId xmlns:p14="http://schemas.microsoft.com/office/powerpoint/2010/main" val="3796945617"/>
+      </p:ext>
+    </p:extLst>
+  </p:cSld>
+  <p:clrMapOvr>
+    <a:masterClrMapping/>
+  </p:clrMapOvr>
+</p:notes>
+</file>
+
+<file path=ppt/notesSlides/notesSlide7.xml><?xml version="1.0" encoding="utf-8"?>
+<p:notes xmlns:a="http://schemas.openxmlformats.org/drawingml/2006/main" xmlns:r="http://schemas.openxmlformats.org/officeDocument/2006/relationships" xmlns:p="http://schemas.openxmlformats.org/presentationml/2006/main">
+  <p:cSld>
+    <p:spTree>
+      <p:nvGrpSpPr>
+        <p:cNvPr id="1" name=""/>
+        <p:cNvGrpSpPr/>
+        <p:nvPr/>
+      </p:nvGrpSpPr>
+      <p:grpSpPr>
+        <a:xfrm>
+          <a:off x="0" y="0"/>
+          <a:ext cx="0" cy="0"/>
+          <a:chOff x="0" y="0"/>
+          <a:chExt cx="0" cy="0"/>
+        </a:xfrm>
+      </p:grpSpPr>
+      <p:sp>
+        <p:nvSpPr>
+          <p:cNvPr id="2" name="Espace réservé de l’image des diapositives 1"/>
+          <p:cNvSpPr>
+            <a:spLocks noGrp="1" noRot="1" noChangeAspect="1"/>
+          </p:cNvSpPr>
+          <p:nvPr>
+            <p:ph type="sldImg"/>
+          </p:nvPr>
+        </p:nvSpPr>
+        <p:spPr/>
+      </p:sp>
+      <p:sp>
+        <p:nvSpPr>
+          <p:cNvPr id="3" name="Espace réservé des commentaires 2"/>
+          <p:cNvSpPr>
+            <a:spLocks noGrp="1"/>
+          </p:cNvSpPr>
+          <p:nvPr>
+            <p:ph type="body" idx="1"/>
+          </p:nvPr>
+        </p:nvSpPr>
+        <p:spPr/>
+        <p:txBody>
+          <a:bodyPr/>
+          <a:lstStyle/>
+          <a:p>
+            <a:endParaRPr lang="fr-FR" dirty="0"/>
+          </a:p>
+        </p:txBody>
+      </p:sp>
+      <p:sp>
+        <p:nvSpPr>
+          <p:cNvPr id="4" name="Espace réservé du numéro de diapositive 3"/>
+          <p:cNvSpPr>
+            <a:spLocks noGrp="1"/>
+          </p:cNvSpPr>
+          <p:nvPr>
+            <p:ph type="sldNum" sz="quarter" idx="10"/>
+          </p:nvPr>
+        </p:nvSpPr>
+        <p:spPr/>
+        <p:txBody>
+          <a:bodyPr/>
+          <a:lstStyle/>
+          <a:p>
+            <a:fld id="{B3CC542E-CDD7-514E-B6A9-FB58F1235490}" type="slidenum">
+              <a:rPr lang="fr-FR" smtClean="0">
+                <a:solidFill>
+                  <a:prstClr val="black"/>
+                </a:solidFill>
+              </a:rPr>
+              <a:pPr/>
+              <a:t>8</a:t>
+            </a:fld>
+            <a:endParaRPr lang="fr-FR">
+              <a:solidFill>
+                <a:prstClr val="black"/>
+              </a:solidFill>
+            </a:endParaRPr>
+          </a:p>
+        </p:txBody>
+      </p:sp>
+    </p:spTree>
+    <p:extLst>
+      <p:ext uri="{BB962C8B-B14F-4D97-AF65-F5344CB8AC3E}">
         <p14:creationId xmlns:p14="http://schemas.microsoft.com/office/powerpoint/2010/main" val="499417011"/>
       </p:ext>
     </p:extLst>
@@ -949,7 +1230,7 @@
           <a:p>
             <a:pPr lvl="0"/>
             <a:r>
-              <a:rPr lang="fr-FR" dirty="0" smtClean="0"/>
+              <a:rPr lang="fr-FR" dirty="0"/>
               <a:t>Modifiez les styles du texte du masque</a:t>
             </a:r>
           </a:p>
@@ -994,13 +1275,6 @@
   <p:clrMapOvr>
     <a:masterClrMapping/>
   </p:clrMapOvr>
-  <p:timing>
-    <p:tnLst>
-      <p:par>
-        <p:cTn xmlns:p14="http://schemas.microsoft.com/office/powerpoint/2010/main" id="1" dur="indefinite" restart="never" nodeType="tmRoot"/>
-      </p:par>
-    </p:tnLst>
-  </p:timing>
 </p:sldLayout>
 </file>
 
@@ -1056,14 +1330,14 @@
           </a:ln>
           <a:extLst>
             <a:ext uri="{909E8E84-426E-40dd-AFC4-6F175D3DCCD1}">
-              <a14:hiddenFill xmlns:a14="http://schemas.microsoft.com/office/drawing/2010/main">
+              <a14:hiddenFill xmlns:a14="http://schemas.microsoft.com/office/drawing/2010/main" xmlns="">
                 <a:solidFill>
                   <a:srgbClr val="FFFFFF"/>
                 </a:solidFill>
               </a14:hiddenFill>
             </a:ext>
             <a:ext uri="{91240B29-F687-4f45-9708-019B960494DF}">
-              <a14:hiddenLine xmlns:a14="http://schemas.microsoft.com/office/drawing/2010/main" w="9525">
+              <a14:hiddenLine xmlns:a14="http://schemas.microsoft.com/office/drawing/2010/main" xmlns="" w="9525">
                 <a:solidFill>
                   <a:srgbClr val="000000"/>
                 </a:solidFill>
@@ -1221,10 +1495,9 @@
           </a:lstStyle>
           <a:p>
             <a:r>
-              <a:rPr lang="fr-FR" dirty="0" smtClean="0"/>
+              <a:rPr lang="fr-FR" dirty="0"/>
               <a:t>Titre</a:t>
             </a:r>
-            <a:endParaRPr lang="fr-FR" dirty="0"/>
           </a:p>
         </p:txBody>
       </p:sp>
@@ -1314,13 +1587,6 @@
   <p:clrMapOvr>
     <a:masterClrMapping/>
   </p:clrMapOvr>
-  <p:timing>
-    <p:tnLst>
-      <p:par>
-        <p:cTn xmlns:p14="http://schemas.microsoft.com/office/powerpoint/2010/main" id="1" dur="indefinite" restart="never" nodeType="tmRoot"/>
-      </p:par>
-    </p:tnLst>
-  </p:timing>
 </p:sldLayout>
 </file>
 
@@ -1679,23 +1945,21 @@
           <a:lstStyle/>
           <a:p>
             <a:r>
-              <a:rPr lang="fr-FR" sz="3500" dirty="0" smtClean="0"/>
-              <a:t>Nom1 Prénom1</a:t>
+              <a:rPr lang="fr-FR" sz="3500" dirty="0"/>
+              <a:t>DEVANT David</a:t>
             </a:r>
           </a:p>
           <a:p>
             <a:r>
-              <a:rPr lang="fr-FR" sz="3500" dirty="0" smtClean="0"/>
-              <a:t>Nom2 Prénom2</a:t>
+              <a:rPr lang="fr-FR" sz="3500" dirty="0"/>
+              <a:t>TROMPAT Aurélien</a:t>
             </a:r>
-            <a:endParaRPr lang="fr-FR" sz="3500" dirty="0" smtClean="0"/>
           </a:p>
           <a:p>
             <a:r>
-              <a:rPr lang="fr-FR" sz="3500" dirty="0" smtClean="0"/>
-              <a:t>Filière xxx</a:t>
+              <a:rPr lang="fr-FR" sz="3500" dirty="0"/>
+              <a:t>Filière SEE</a:t>
             </a:r>
-            <a:endParaRPr lang="fr-FR" sz="3500" dirty="0" smtClean="0"/>
           </a:p>
         </p:txBody>
       </p:sp>
@@ -1707,8 +1971,8 @@
         </p:nvSpPr>
         <p:spPr>
           <a:xfrm>
-            <a:off x="1550455" y="578256"/>
-            <a:ext cx="5876967" cy="646331"/>
+            <a:off x="0" y="0"/>
+            <a:ext cx="9137947" cy="1384995"/>
           </a:xfrm>
           <a:prstGeom prst="rect">
             <a:avLst/>
@@ -1723,10 +1987,10 @@
           <a:p>
             <a:pPr algn="ctr"/>
             <a:r>
-              <a:rPr lang="fr-FR" sz="3600" b="1" dirty="0" smtClean="0"/>
-              <a:t>Titre du projet</a:t>
+              <a:rPr lang="fr-FR" sz="2800" b="1" dirty="0"/>
+              <a:t>Conception et implémentation sur circuit FPGA d’une architecture composée de plusieurs processeurs programmables dédiés pour de la représentation 3D</a:t>
             </a:r>
-            <a:endParaRPr lang="fr-FR" sz="3600" b="1" dirty="0"/>
+            <a:endParaRPr lang="fr-FR" sz="4800" b="1" dirty="0"/>
           </a:p>
         </p:txBody>
       </p:sp>
@@ -1740,13 +2004,6 @@
   <p:clrMapOvr>
     <a:masterClrMapping/>
   </p:clrMapOvr>
-  <p:timing>
-    <p:tnLst>
-      <p:par>
-        <p:cTn xmlns:p14="http://schemas.microsoft.com/office/powerpoint/2010/main" id="1" dur="indefinite" restart="never" nodeType="tmRoot"/>
-      </p:par>
-    </p:tnLst>
-  </p:timing>
 </p:sld>
 </file>
 
@@ -1967,21 +2224,112 @@
           </a:lstStyle>
           <a:p>
             <a:r>
-              <a:rPr lang="fr-FR" sz="3600" dirty="0" smtClean="0">
+              <a:rPr lang="fr-FR" sz="3600" dirty="0">
                 <a:solidFill>
                   <a:prstClr val="black"/>
                 </a:solidFill>
               </a:rPr>
               <a:t>Contexte du projet</a:t>
             </a:r>
-            <a:endParaRPr lang="fr-FR" sz="3600" dirty="0">
-              <a:solidFill>
-                <a:prstClr val="black"/>
-              </a:solidFill>
-            </a:endParaRPr>
           </a:p>
         </p:txBody>
       </p:sp>
+      <p:sp>
+        <p:nvSpPr>
+          <p:cNvPr id="2" name="TextBox 1">
+            <a:extLst>
+              <a:ext uri="{FF2B5EF4-FFF2-40B4-BE49-F238E27FC236}">
+                <a16:creationId xmlns:a16="http://schemas.microsoft.com/office/drawing/2014/main" id="{30715BEE-E782-904A-9BBA-20056DC42AF2}"/>
+              </a:ext>
+            </a:extLst>
+          </p:cNvPr>
+          <p:cNvSpPr txBox="1"/>
+          <p:nvPr/>
+        </p:nvSpPr>
+        <p:spPr>
+          <a:xfrm>
+            <a:off x="741872" y="1639019"/>
+            <a:ext cx="6933052" cy="1569660"/>
+          </a:xfrm>
+          <a:prstGeom prst="rect">
+            <a:avLst/>
+          </a:prstGeom>
+          <a:noFill/>
+        </p:spPr>
+        <p:txBody>
+          <a:bodyPr wrap="none" rtlCol="0">
+            <a:spAutoFit/>
+          </a:bodyPr>
+          <a:lstStyle/>
+          <a:p>
+            <a:pPr marL="285750" indent="-285750">
+              <a:buFont typeface="Arial" panose="020B0604020202020204" pitchFamily="34" charset="0"/>
+              <a:buChar char="•"/>
+            </a:pPr>
+            <a:r>
+              <a:rPr lang="fr-FR" sz="2400" dirty="0"/>
+              <a:t>Conception d’un processeur 8 bits sur FPGA</a:t>
+            </a:r>
+          </a:p>
+          <a:p>
+            <a:pPr marL="285750" indent="-285750">
+              <a:buFont typeface="Arial" panose="020B0604020202020204" pitchFamily="34" charset="0"/>
+              <a:buChar char="•"/>
+            </a:pPr>
+            <a:endParaRPr lang="fr-FR" sz="2400" dirty="0"/>
+          </a:p>
+          <a:p>
+            <a:pPr marL="285750" indent="-285750">
+              <a:buFont typeface="Arial" panose="020B0604020202020204" pitchFamily="34" charset="0"/>
+              <a:buChar char="•"/>
+            </a:pPr>
+            <a:r>
+              <a:rPr lang="fr-FR" sz="2400" dirty="0"/>
+              <a:t>Reprise d’un projet de la promotion SEE précédente</a:t>
+            </a:r>
+          </a:p>
+          <a:p>
+            <a:pPr marL="742950" lvl="1" indent="-285750">
+              <a:buFont typeface="Arial" panose="020B0604020202020204" pitchFamily="34" charset="0"/>
+              <a:buChar char="•"/>
+            </a:pPr>
+            <a:r>
+              <a:rPr lang="fr-FR" sz="2400" dirty="0"/>
+              <a:t>Auteurs : Pierre JOUBERT et Julien BESSE</a:t>
+            </a:r>
+          </a:p>
+        </p:txBody>
+      </p:sp>
+      <p:pic>
+        <p:nvPicPr>
+          <p:cNvPr id="23" name="Picture 22">
+            <a:extLst>
+              <a:ext uri="{FF2B5EF4-FFF2-40B4-BE49-F238E27FC236}">
+                <a16:creationId xmlns:a16="http://schemas.microsoft.com/office/drawing/2014/main" id="{C2BBCEA6-E043-D443-9824-D7B89A31EDF2}"/>
+              </a:ext>
+            </a:extLst>
+          </p:cNvPr>
+          <p:cNvPicPr>
+            <a:picLocks noChangeAspect="1"/>
+          </p:cNvPicPr>
+          <p:nvPr/>
+        </p:nvPicPr>
+        <p:blipFill>
+          <a:blip r:embed="rId3"/>
+          <a:stretch>
+            <a:fillRect/>
+          </a:stretch>
+        </p:blipFill>
+        <p:spPr>
+          <a:xfrm>
+            <a:off x="2931767" y="3208679"/>
+            <a:ext cx="3280465" cy="3070386"/>
+          </a:xfrm>
+          <a:prstGeom prst="rect">
+            <a:avLst/>
+          </a:prstGeom>
+        </p:spPr>
+      </p:pic>
     </p:spTree>
     <p:extLst>
       <p:ext uri="{BB962C8B-B14F-4D97-AF65-F5344CB8AC3E}">
@@ -1992,13 +2340,6 @@
   <p:clrMapOvr>
     <a:masterClrMapping/>
   </p:clrMapOvr>
-  <p:timing>
-    <p:tnLst>
-      <p:par>
-        <p:cTn xmlns:p14="http://schemas.microsoft.com/office/powerpoint/2010/main" id="1" dur="indefinite" restart="never" nodeType="tmRoot"/>
-      </p:par>
-    </p:tnLst>
-  </p:timing>
 </p:sld>
 </file>
 
@@ -2219,21 +2560,358 @@
           </a:lstStyle>
           <a:p>
             <a:r>
-              <a:rPr lang="fr-FR" sz="3600" dirty="0" smtClean="0">
+              <a:rPr lang="fr-FR" sz="3600" dirty="0">
                 <a:solidFill>
                   <a:prstClr val="black"/>
                 </a:solidFill>
               </a:rPr>
               <a:t>Plan de la présentation</a:t>
             </a:r>
-            <a:endParaRPr lang="fr-FR" sz="3600" dirty="0">
-              <a:solidFill>
-                <a:prstClr val="black"/>
-              </a:solidFill>
-            </a:endParaRPr>
           </a:p>
         </p:txBody>
       </p:sp>
+      <p:pic>
+        <p:nvPicPr>
+          <p:cNvPr id="6" name="Picture 5">
+            <a:extLst>
+              <a:ext uri="{FF2B5EF4-FFF2-40B4-BE49-F238E27FC236}">
+                <a16:creationId xmlns:a16="http://schemas.microsoft.com/office/drawing/2014/main" id="{65C3FDFE-7474-FE41-9645-2B6CA43C3B9E}"/>
+              </a:ext>
+            </a:extLst>
+          </p:cNvPr>
+          <p:cNvPicPr>
+            <a:picLocks noChangeAspect="1"/>
+          </p:cNvPicPr>
+          <p:nvPr/>
+        </p:nvPicPr>
+        <p:blipFill>
+          <a:blip r:embed="rId3"/>
+          <a:stretch>
+            <a:fillRect/>
+          </a:stretch>
+        </p:blipFill>
+        <p:spPr>
+          <a:xfrm>
+            <a:off x="333935" y="1542936"/>
+            <a:ext cx="3340100" cy="1092200"/>
+          </a:xfrm>
+          <a:prstGeom prst="rect">
+            <a:avLst/>
+          </a:prstGeom>
+        </p:spPr>
+      </p:pic>
+      <p:pic>
+        <p:nvPicPr>
+          <p:cNvPr id="8" name="Picture 7">
+            <a:extLst>
+              <a:ext uri="{FF2B5EF4-FFF2-40B4-BE49-F238E27FC236}">
+                <a16:creationId xmlns:a16="http://schemas.microsoft.com/office/drawing/2014/main" id="{6476F4BC-6090-B049-8428-10B7C3007933}"/>
+              </a:ext>
+            </a:extLst>
+          </p:cNvPr>
+          <p:cNvPicPr>
+            <a:picLocks noChangeAspect="1"/>
+          </p:cNvPicPr>
+          <p:nvPr/>
+        </p:nvPicPr>
+        <p:blipFill>
+          <a:blip r:embed="rId4"/>
+          <a:stretch>
+            <a:fillRect/>
+          </a:stretch>
+        </p:blipFill>
+        <p:spPr>
+          <a:xfrm>
+            <a:off x="6420427" y="1018895"/>
+            <a:ext cx="1442207" cy="1620079"/>
+          </a:xfrm>
+          <a:prstGeom prst="rect">
+            <a:avLst/>
+          </a:prstGeom>
+        </p:spPr>
+      </p:pic>
+      <p:pic>
+        <p:nvPicPr>
+          <p:cNvPr id="10" name="Picture 9">
+            <a:extLst>
+              <a:ext uri="{FF2B5EF4-FFF2-40B4-BE49-F238E27FC236}">
+                <a16:creationId xmlns:a16="http://schemas.microsoft.com/office/drawing/2014/main" id="{E26C3968-C8F9-F349-BAEF-B59E1E8C1F26}"/>
+              </a:ext>
+            </a:extLst>
+          </p:cNvPr>
+          <p:cNvPicPr>
+            <a:picLocks noChangeAspect="1"/>
+          </p:cNvPicPr>
+          <p:nvPr/>
+        </p:nvPicPr>
+        <p:blipFill>
+          <a:blip r:embed="rId5"/>
+          <a:stretch>
+            <a:fillRect/>
+          </a:stretch>
+        </p:blipFill>
+        <p:spPr>
+          <a:xfrm>
+            <a:off x="2093843" y="3429000"/>
+            <a:ext cx="4956313" cy="1190167"/>
+          </a:xfrm>
+          <a:prstGeom prst="rect">
+            <a:avLst/>
+          </a:prstGeom>
+        </p:spPr>
+      </p:pic>
+      <p:pic>
+        <p:nvPicPr>
+          <p:cNvPr id="12" name="Picture 11">
+            <a:extLst>
+              <a:ext uri="{FF2B5EF4-FFF2-40B4-BE49-F238E27FC236}">
+                <a16:creationId xmlns:a16="http://schemas.microsoft.com/office/drawing/2014/main" id="{798E73A8-A7C9-DB42-BC46-3B71F2471A21}"/>
+              </a:ext>
+            </a:extLst>
+          </p:cNvPr>
+          <p:cNvPicPr>
+            <a:picLocks noChangeAspect="1"/>
+          </p:cNvPicPr>
+          <p:nvPr/>
+        </p:nvPicPr>
+        <p:blipFill>
+          <a:blip r:embed="rId6"/>
+          <a:stretch>
+            <a:fillRect/>
+          </a:stretch>
+        </p:blipFill>
+        <p:spPr>
+          <a:xfrm>
+            <a:off x="2539471" y="5045749"/>
+            <a:ext cx="2769355" cy="851467"/>
+          </a:xfrm>
+          <a:prstGeom prst="rect">
+            <a:avLst/>
+          </a:prstGeom>
+        </p:spPr>
+      </p:pic>
+      <p:sp>
+        <p:nvSpPr>
+          <p:cNvPr id="13" name="TextBox 12">
+            <a:extLst>
+              <a:ext uri="{FF2B5EF4-FFF2-40B4-BE49-F238E27FC236}">
+                <a16:creationId xmlns:a16="http://schemas.microsoft.com/office/drawing/2014/main" id="{6638146E-1AFB-3A44-9687-BBF3B4465DB4}"/>
+              </a:ext>
+            </a:extLst>
+          </p:cNvPr>
+          <p:cNvSpPr txBox="1"/>
+          <p:nvPr/>
+        </p:nvSpPr>
+        <p:spPr>
+          <a:xfrm>
+            <a:off x="2630845" y="5966497"/>
+            <a:ext cx="2586606" cy="369332"/>
+          </a:xfrm>
+          <a:prstGeom prst="rect">
+            <a:avLst/>
+          </a:prstGeom>
+          <a:noFill/>
+        </p:spPr>
+        <p:txBody>
+          <a:bodyPr wrap="none" rtlCol="0">
+            <a:spAutoFit/>
+          </a:bodyPr>
+          <a:lstStyle/>
+          <a:p>
+            <a:r>
+              <a:rPr lang="fr-FR" dirty="0"/>
+              <a:t>3. Management du projet</a:t>
+            </a:r>
+          </a:p>
+        </p:txBody>
+      </p:sp>
+      <p:sp>
+        <p:nvSpPr>
+          <p:cNvPr id="14" name="TextBox 13">
+            <a:extLst>
+              <a:ext uri="{FF2B5EF4-FFF2-40B4-BE49-F238E27FC236}">
+                <a16:creationId xmlns:a16="http://schemas.microsoft.com/office/drawing/2014/main" id="{4DE6840A-FA87-FA4A-B193-89CE4D947286}"/>
+              </a:ext>
+            </a:extLst>
+          </p:cNvPr>
+          <p:cNvSpPr txBox="1"/>
+          <p:nvPr/>
+        </p:nvSpPr>
+        <p:spPr>
+          <a:xfrm>
+            <a:off x="5843740" y="2705391"/>
+            <a:ext cx="2966325" cy="369332"/>
+          </a:xfrm>
+          <a:prstGeom prst="rect">
+            <a:avLst/>
+          </a:prstGeom>
+          <a:noFill/>
+        </p:spPr>
+        <p:txBody>
+          <a:bodyPr wrap="none" rtlCol="0">
+            <a:spAutoFit/>
+          </a:bodyPr>
+          <a:lstStyle/>
+          <a:p>
+            <a:r>
+              <a:rPr lang="fr-FR" dirty="0"/>
+              <a:t>2. Conception du compilateur</a:t>
+            </a:r>
+          </a:p>
+        </p:txBody>
+      </p:sp>
+      <p:sp>
+        <p:nvSpPr>
+          <p:cNvPr id="15" name="TextBox 14">
+            <a:extLst>
+              <a:ext uri="{FF2B5EF4-FFF2-40B4-BE49-F238E27FC236}">
+                <a16:creationId xmlns:a16="http://schemas.microsoft.com/office/drawing/2014/main" id="{4AE98890-4624-FA4D-9C22-13E1CA378499}"/>
+              </a:ext>
+            </a:extLst>
+          </p:cNvPr>
+          <p:cNvSpPr txBox="1"/>
+          <p:nvPr/>
+        </p:nvSpPr>
+        <p:spPr>
+          <a:xfrm>
+            <a:off x="333935" y="2704417"/>
+            <a:ext cx="3590214" cy="369332"/>
+          </a:xfrm>
+          <a:prstGeom prst="rect">
+            <a:avLst/>
+          </a:prstGeom>
+          <a:noFill/>
+        </p:spPr>
+        <p:txBody>
+          <a:bodyPr wrap="none" rtlCol="0">
+            <a:spAutoFit/>
+          </a:bodyPr>
+          <a:lstStyle/>
+          <a:p>
+            <a:r>
+              <a:rPr lang="fr-FR" dirty="0"/>
+              <a:t>1. La description matérielle en VHDL</a:t>
+            </a:r>
+          </a:p>
+        </p:txBody>
+      </p:sp>
+      <p:cxnSp>
+        <p:nvCxnSpPr>
+          <p:cNvPr id="17" name="Straight Connector 16">
+            <a:extLst>
+              <a:ext uri="{FF2B5EF4-FFF2-40B4-BE49-F238E27FC236}">
+                <a16:creationId xmlns:a16="http://schemas.microsoft.com/office/drawing/2014/main" id="{9C11DCCA-EAF9-F443-A612-1EA6BB707ECC}"/>
+              </a:ext>
+            </a:extLst>
+          </p:cNvPr>
+          <p:cNvCxnSpPr>
+            <a:stCxn id="15" idx="2"/>
+          </p:cNvCxnSpPr>
+          <p:nvPr/>
+        </p:nvCxnSpPr>
+        <p:spPr>
+          <a:xfrm>
+            <a:off x="2129042" y="3073749"/>
+            <a:ext cx="905706" cy="530842"/>
+          </a:xfrm>
+          <a:prstGeom prst="line">
+            <a:avLst/>
+          </a:prstGeom>
+        </p:spPr>
+        <p:style>
+          <a:lnRef idx="1">
+            <a:schemeClr val="dk1"/>
+          </a:lnRef>
+          <a:fillRef idx="0">
+            <a:schemeClr val="dk1"/>
+          </a:fillRef>
+          <a:effectRef idx="0">
+            <a:schemeClr val="dk1"/>
+          </a:effectRef>
+          <a:fontRef idx="minor">
+            <a:schemeClr val="tx1"/>
+          </a:fontRef>
+        </p:style>
+      </p:cxnSp>
+      <p:cxnSp>
+        <p:nvCxnSpPr>
+          <p:cNvPr id="18" name="Straight Connector 17">
+            <a:extLst>
+              <a:ext uri="{FF2B5EF4-FFF2-40B4-BE49-F238E27FC236}">
+                <a16:creationId xmlns:a16="http://schemas.microsoft.com/office/drawing/2014/main" id="{D189F0E1-40D5-9A4F-A577-044B0735040E}"/>
+              </a:ext>
+            </a:extLst>
+          </p:cNvPr>
+          <p:cNvCxnSpPr>
+            <a:cxnSpLocks/>
+            <a:stCxn id="14" idx="2"/>
+          </p:cNvCxnSpPr>
+          <p:nvPr/>
+        </p:nvCxnSpPr>
+        <p:spPr>
+          <a:xfrm flipH="1">
+            <a:off x="6851374" y="3074723"/>
+            <a:ext cx="475529" cy="708555"/>
+          </a:xfrm>
+          <a:prstGeom prst="line">
+            <a:avLst/>
+          </a:prstGeom>
+        </p:spPr>
+        <p:style>
+          <a:lnRef idx="1">
+            <a:schemeClr val="dk1"/>
+          </a:lnRef>
+          <a:fillRef idx="0">
+            <a:schemeClr val="dk1"/>
+          </a:fillRef>
+          <a:effectRef idx="0">
+            <a:schemeClr val="dk1"/>
+          </a:effectRef>
+          <a:fontRef idx="minor">
+            <a:schemeClr val="tx1"/>
+          </a:fontRef>
+        </p:style>
+      </p:cxnSp>
+      <p:cxnSp>
+        <p:nvCxnSpPr>
+          <p:cNvPr id="21" name="Straight Connector 20">
+            <a:extLst>
+              <a:ext uri="{FF2B5EF4-FFF2-40B4-BE49-F238E27FC236}">
+                <a16:creationId xmlns:a16="http://schemas.microsoft.com/office/drawing/2014/main" id="{C43908A8-4D72-FC42-A5BF-0488A45D9170}"/>
+              </a:ext>
+            </a:extLst>
+          </p:cNvPr>
+          <p:cNvCxnSpPr>
+            <a:cxnSpLocks/>
+            <a:stCxn id="10" idx="2"/>
+            <a:endCxn id="12" idx="0"/>
+          </p:cNvCxnSpPr>
+          <p:nvPr/>
+        </p:nvCxnSpPr>
+        <p:spPr>
+          <a:xfrm flipH="1">
+            <a:off x="3924149" y="4619167"/>
+            <a:ext cx="647851" cy="426582"/>
+          </a:xfrm>
+          <a:prstGeom prst="line">
+            <a:avLst/>
+          </a:prstGeom>
+        </p:spPr>
+        <p:style>
+          <a:lnRef idx="1">
+            <a:schemeClr val="dk1"/>
+          </a:lnRef>
+          <a:fillRef idx="0">
+            <a:schemeClr val="dk1"/>
+          </a:fillRef>
+          <a:effectRef idx="0">
+            <a:schemeClr val="dk1"/>
+          </a:effectRef>
+          <a:fontRef idx="minor">
+            <a:schemeClr val="tx1"/>
+          </a:fontRef>
+        </p:style>
+      </p:cxnSp>
     </p:spTree>
     <p:extLst>
       <p:ext uri="{BB962C8B-B14F-4D97-AF65-F5344CB8AC3E}">
@@ -2244,13 +2922,6 @@
   <p:clrMapOvr>
     <a:masterClrMapping/>
   </p:clrMapOvr>
-  <p:timing>
-    <p:tnLst>
-      <p:par>
-        <p:cTn xmlns:p14="http://schemas.microsoft.com/office/powerpoint/2010/main" id="1" dur="indefinite" restart="never" nodeType="tmRoot"/>
-      </p:par>
-    </p:tnLst>
-  </p:timing>
 </p:sld>
 </file>
 
@@ -2471,21 +3142,454 @@
           </a:lstStyle>
           <a:p>
             <a:r>
-              <a:rPr lang="fr-FR" sz="3600" dirty="0" smtClean="0">
+              <a:rPr lang="fr-FR" sz="3600" dirty="0">
                 <a:solidFill>
                   <a:prstClr val="black"/>
                 </a:solidFill>
               </a:rPr>
-              <a:t>Conclusion</a:t>
+              <a:t>1. Description matérielle</a:t>
             </a:r>
-            <a:endParaRPr lang="fr-FR" sz="3600" dirty="0">
-              <a:solidFill>
-                <a:prstClr val="black"/>
-              </a:solidFill>
-            </a:endParaRPr>
           </a:p>
         </p:txBody>
       </p:sp>
+      <p:sp>
+        <p:nvSpPr>
+          <p:cNvPr id="3" name="Rectangle 2">
+            <a:extLst>
+              <a:ext uri="{FF2B5EF4-FFF2-40B4-BE49-F238E27FC236}">
+                <a16:creationId xmlns:a16="http://schemas.microsoft.com/office/drawing/2014/main" id="{163FA1EC-EB14-C04D-9688-C92809F90C35}"/>
+              </a:ext>
+            </a:extLst>
+          </p:cNvPr>
+          <p:cNvSpPr/>
+          <p:nvPr/>
+        </p:nvSpPr>
+        <p:spPr>
+          <a:xfrm>
+            <a:off x="1668551" y="3791637"/>
+            <a:ext cx="1192696" cy="1192696"/>
+          </a:xfrm>
+          <a:prstGeom prst="rect">
+            <a:avLst/>
+          </a:prstGeom>
+          <a:ln>
+            <a:noFill/>
+          </a:ln>
+        </p:spPr>
+        <p:style>
+          <a:lnRef idx="2">
+            <a:schemeClr val="accent1">
+              <a:shade val="50000"/>
+            </a:schemeClr>
+          </a:lnRef>
+          <a:fillRef idx="1">
+            <a:schemeClr val="accent1"/>
+          </a:fillRef>
+          <a:effectRef idx="0">
+            <a:schemeClr val="accent1"/>
+          </a:effectRef>
+          <a:fontRef idx="minor">
+            <a:schemeClr val="lt1"/>
+          </a:fontRef>
+        </p:style>
+        <p:txBody>
+          <a:bodyPr rtlCol="0" anchor="ctr"/>
+          <a:lstStyle/>
+          <a:p>
+            <a:pPr algn="ctr"/>
+            <a:r>
+              <a:rPr lang="fr-FR" sz="2000" dirty="0"/>
+              <a:t>CPU</a:t>
+            </a:r>
+          </a:p>
+        </p:txBody>
+      </p:sp>
+      <p:sp>
+        <p:nvSpPr>
+          <p:cNvPr id="5" name="Rectangle 4">
+            <a:extLst>
+              <a:ext uri="{FF2B5EF4-FFF2-40B4-BE49-F238E27FC236}">
+                <a16:creationId xmlns:a16="http://schemas.microsoft.com/office/drawing/2014/main" id="{6F5AF182-D7B9-3B42-AFE2-79BBCF6546B2}"/>
+              </a:ext>
+            </a:extLst>
+          </p:cNvPr>
+          <p:cNvSpPr/>
+          <p:nvPr/>
+        </p:nvSpPr>
+        <p:spPr>
+          <a:xfrm>
+            <a:off x="4700882" y="3791637"/>
+            <a:ext cx="1192696" cy="1192696"/>
+          </a:xfrm>
+          <a:prstGeom prst="rect">
+            <a:avLst/>
+          </a:prstGeom>
+          <a:ln>
+            <a:noFill/>
+          </a:ln>
+        </p:spPr>
+        <p:style>
+          <a:lnRef idx="2">
+            <a:schemeClr val="accent1">
+              <a:shade val="50000"/>
+            </a:schemeClr>
+          </a:lnRef>
+          <a:fillRef idx="1">
+            <a:schemeClr val="accent1"/>
+          </a:fillRef>
+          <a:effectRef idx="0">
+            <a:schemeClr val="accent1"/>
+          </a:effectRef>
+          <a:fontRef idx="minor">
+            <a:schemeClr val="lt1"/>
+          </a:fontRef>
+        </p:style>
+        <p:txBody>
+          <a:bodyPr rtlCol="0" anchor="ctr"/>
+          <a:lstStyle/>
+          <a:p>
+            <a:pPr algn="ctr"/>
+            <a:r>
+              <a:rPr lang="fr-FR" sz="2000" dirty="0"/>
+              <a:t>GPU</a:t>
+            </a:r>
+          </a:p>
+        </p:txBody>
+      </p:sp>
+      <p:sp>
+        <p:nvSpPr>
+          <p:cNvPr id="6" name="Rectangle 5">
+            <a:extLst>
+              <a:ext uri="{FF2B5EF4-FFF2-40B4-BE49-F238E27FC236}">
+                <a16:creationId xmlns:a16="http://schemas.microsoft.com/office/drawing/2014/main" id="{94257E66-0A39-334A-B8E4-81F8ABCE7AB8}"/>
+              </a:ext>
+            </a:extLst>
+          </p:cNvPr>
+          <p:cNvSpPr/>
+          <p:nvPr/>
+        </p:nvSpPr>
+        <p:spPr>
+          <a:xfrm>
+            <a:off x="6934445" y="3182796"/>
+            <a:ext cx="1798737" cy="926137"/>
+          </a:xfrm>
+          <a:prstGeom prst="rect">
+            <a:avLst/>
+          </a:prstGeom>
+          <a:ln>
+            <a:noFill/>
+          </a:ln>
+        </p:spPr>
+        <p:style>
+          <a:lnRef idx="2">
+            <a:schemeClr val="accent1">
+              <a:shade val="50000"/>
+            </a:schemeClr>
+          </a:lnRef>
+          <a:fillRef idx="1">
+            <a:schemeClr val="accent1"/>
+          </a:fillRef>
+          <a:effectRef idx="0">
+            <a:schemeClr val="accent1"/>
+          </a:effectRef>
+          <a:fontRef idx="minor">
+            <a:schemeClr val="lt1"/>
+          </a:fontRef>
+        </p:style>
+        <p:txBody>
+          <a:bodyPr rtlCol="0" anchor="ctr"/>
+          <a:lstStyle/>
+          <a:p>
+            <a:pPr algn="ctr"/>
+            <a:r>
+              <a:rPr lang="fr-FR" sz="2000" dirty="0"/>
+              <a:t>Écran VGA</a:t>
+            </a:r>
+          </a:p>
+        </p:txBody>
+      </p:sp>
+      <p:sp>
+        <p:nvSpPr>
+          <p:cNvPr id="7" name="Rectangle 6">
+            <a:extLst>
+              <a:ext uri="{FF2B5EF4-FFF2-40B4-BE49-F238E27FC236}">
+                <a16:creationId xmlns:a16="http://schemas.microsoft.com/office/drawing/2014/main" id="{40DD2C56-4C3F-C84B-8780-86A22CE2BB3B}"/>
+              </a:ext>
+            </a:extLst>
+          </p:cNvPr>
+          <p:cNvSpPr/>
+          <p:nvPr/>
+        </p:nvSpPr>
+        <p:spPr>
+          <a:xfrm>
+            <a:off x="7759392" y="4108934"/>
+            <a:ext cx="125651" cy="542582"/>
+          </a:xfrm>
+          <a:prstGeom prst="rect">
+            <a:avLst/>
+          </a:prstGeom>
+          <a:ln>
+            <a:noFill/>
+          </a:ln>
+        </p:spPr>
+        <p:style>
+          <a:lnRef idx="2">
+            <a:schemeClr val="accent1">
+              <a:shade val="50000"/>
+            </a:schemeClr>
+          </a:lnRef>
+          <a:fillRef idx="1">
+            <a:schemeClr val="accent1"/>
+          </a:fillRef>
+          <a:effectRef idx="0">
+            <a:schemeClr val="accent1"/>
+          </a:effectRef>
+          <a:fontRef idx="minor">
+            <a:schemeClr val="lt1"/>
+          </a:fontRef>
+        </p:style>
+        <p:txBody>
+          <a:bodyPr rtlCol="0" anchor="ctr"/>
+          <a:lstStyle/>
+          <a:p>
+            <a:pPr algn="ctr"/>
+            <a:endParaRPr lang="fr-FR" sz="2000" dirty="0"/>
+          </a:p>
+        </p:txBody>
+      </p:sp>
+      <p:sp>
+        <p:nvSpPr>
+          <p:cNvPr id="8" name="Rectangle 7">
+            <a:extLst>
+              <a:ext uri="{FF2B5EF4-FFF2-40B4-BE49-F238E27FC236}">
+                <a16:creationId xmlns:a16="http://schemas.microsoft.com/office/drawing/2014/main" id="{2B48AE42-0185-F14A-8269-EF1BE08429EC}"/>
+              </a:ext>
+            </a:extLst>
+          </p:cNvPr>
+          <p:cNvSpPr/>
+          <p:nvPr/>
+        </p:nvSpPr>
+        <p:spPr>
+          <a:xfrm>
+            <a:off x="7225869" y="4651516"/>
+            <a:ext cx="1192696" cy="152400"/>
+          </a:xfrm>
+          <a:prstGeom prst="rect">
+            <a:avLst/>
+          </a:prstGeom>
+          <a:ln>
+            <a:noFill/>
+          </a:ln>
+        </p:spPr>
+        <p:style>
+          <a:lnRef idx="2">
+            <a:schemeClr val="accent1">
+              <a:shade val="50000"/>
+            </a:schemeClr>
+          </a:lnRef>
+          <a:fillRef idx="1">
+            <a:schemeClr val="accent1"/>
+          </a:fillRef>
+          <a:effectRef idx="0">
+            <a:schemeClr val="accent1"/>
+          </a:effectRef>
+          <a:fontRef idx="minor">
+            <a:schemeClr val="lt1"/>
+          </a:fontRef>
+        </p:style>
+        <p:txBody>
+          <a:bodyPr rtlCol="0" anchor="ctr"/>
+          <a:lstStyle/>
+          <a:p>
+            <a:pPr algn="ctr"/>
+            <a:endParaRPr lang="fr-FR" sz="2000" dirty="0"/>
+          </a:p>
+        </p:txBody>
+      </p:sp>
+      <p:sp>
+        <p:nvSpPr>
+          <p:cNvPr id="9" name="Rectangle 8">
+            <a:extLst>
+              <a:ext uri="{FF2B5EF4-FFF2-40B4-BE49-F238E27FC236}">
+                <a16:creationId xmlns:a16="http://schemas.microsoft.com/office/drawing/2014/main" id="{14CF2901-8895-A549-B79F-D649C7AB2184}"/>
+              </a:ext>
+            </a:extLst>
+          </p:cNvPr>
+          <p:cNvSpPr/>
+          <p:nvPr/>
+        </p:nvSpPr>
+        <p:spPr>
+          <a:xfrm>
+            <a:off x="3341189" y="3791638"/>
+            <a:ext cx="879751" cy="1192696"/>
+          </a:xfrm>
+          <a:prstGeom prst="rect">
+            <a:avLst/>
+          </a:prstGeom>
+          <a:ln>
+            <a:noFill/>
+          </a:ln>
+        </p:spPr>
+        <p:style>
+          <a:lnRef idx="2">
+            <a:schemeClr val="accent1">
+              <a:shade val="50000"/>
+            </a:schemeClr>
+          </a:lnRef>
+          <a:fillRef idx="1">
+            <a:schemeClr val="accent1"/>
+          </a:fillRef>
+          <a:effectRef idx="0">
+            <a:schemeClr val="accent1"/>
+          </a:effectRef>
+          <a:fontRef idx="minor">
+            <a:schemeClr val="lt1"/>
+          </a:fontRef>
+        </p:style>
+        <p:txBody>
+          <a:bodyPr rtlCol="0" anchor="ctr"/>
+          <a:lstStyle/>
+          <a:p>
+            <a:pPr algn="ctr"/>
+            <a:r>
+              <a:rPr lang="fr-FR" sz="2000" dirty="0"/>
+              <a:t>RAM</a:t>
+            </a:r>
+          </a:p>
+        </p:txBody>
+      </p:sp>
+      <p:cxnSp>
+        <p:nvCxnSpPr>
+          <p:cNvPr id="10" name="Straight Arrow Connector 9">
+            <a:extLst>
+              <a:ext uri="{FF2B5EF4-FFF2-40B4-BE49-F238E27FC236}">
+                <a16:creationId xmlns:a16="http://schemas.microsoft.com/office/drawing/2014/main" id="{1D074C59-B734-B746-BFEF-7D463A6092CB}"/>
+              </a:ext>
+            </a:extLst>
+          </p:cNvPr>
+          <p:cNvCxnSpPr>
+            <a:cxnSpLocks/>
+            <a:stCxn id="3" idx="3"/>
+            <a:endCxn id="9" idx="1"/>
+          </p:cNvCxnSpPr>
+          <p:nvPr/>
+        </p:nvCxnSpPr>
+        <p:spPr>
+          <a:xfrm>
+            <a:off x="2861247" y="4387985"/>
+            <a:ext cx="479942" cy="1"/>
+          </a:xfrm>
+          <a:prstGeom prst="straightConnector1">
+            <a:avLst/>
+          </a:prstGeom>
+          <a:ln w="57150">
+            <a:headEnd type="triangle"/>
+            <a:tailEnd type="triangle"/>
+          </a:ln>
+        </p:spPr>
+        <p:style>
+          <a:lnRef idx="1">
+            <a:schemeClr val="accent5"/>
+          </a:lnRef>
+          <a:fillRef idx="0">
+            <a:schemeClr val="accent5"/>
+          </a:fillRef>
+          <a:effectRef idx="0">
+            <a:schemeClr val="accent5"/>
+          </a:effectRef>
+          <a:fontRef idx="minor">
+            <a:schemeClr val="tx1"/>
+          </a:fontRef>
+        </p:style>
+      </p:cxnSp>
+      <p:cxnSp>
+        <p:nvCxnSpPr>
+          <p:cNvPr id="11" name="Straight Arrow Connector 10">
+            <a:extLst>
+              <a:ext uri="{FF2B5EF4-FFF2-40B4-BE49-F238E27FC236}">
+                <a16:creationId xmlns:a16="http://schemas.microsoft.com/office/drawing/2014/main" id="{52DF41C0-1CB9-F34D-8DD7-3349451188CD}"/>
+              </a:ext>
+            </a:extLst>
+          </p:cNvPr>
+          <p:cNvCxnSpPr>
+            <a:cxnSpLocks/>
+            <a:stCxn id="5" idx="1"/>
+            <a:endCxn id="9" idx="3"/>
+          </p:cNvCxnSpPr>
+          <p:nvPr/>
+        </p:nvCxnSpPr>
+        <p:spPr>
+          <a:xfrm flipH="1">
+            <a:off x="4220940" y="4387985"/>
+            <a:ext cx="479942" cy="1"/>
+          </a:xfrm>
+          <a:prstGeom prst="straightConnector1">
+            <a:avLst/>
+          </a:prstGeom>
+          <a:ln w="57150">
+            <a:headEnd type="triangle"/>
+            <a:tailEnd type="triangle"/>
+          </a:ln>
+        </p:spPr>
+        <p:style>
+          <a:lnRef idx="1">
+            <a:schemeClr val="accent5"/>
+          </a:lnRef>
+          <a:fillRef idx="0">
+            <a:schemeClr val="accent5"/>
+          </a:fillRef>
+          <a:effectRef idx="0">
+            <a:schemeClr val="accent5"/>
+          </a:effectRef>
+          <a:fontRef idx="minor">
+            <a:schemeClr val="tx1"/>
+          </a:fontRef>
+        </p:style>
+      </p:cxnSp>
+      <p:cxnSp>
+        <p:nvCxnSpPr>
+          <p:cNvPr id="12" name="Straight Arrow Connector 11">
+            <a:extLst>
+              <a:ext uri="{FF2B5EF4-FFF2-40B4-BE49-F238E27FC236}">
+                <a16:creationId xmlns:a16="http://schemas.microsoft.com/office/drawing/2014/main" id="{916B49C8-6F2C-AE45-905A-8A1F6EFF8658}"/>
+              </a:ext>
+            </a:extLst>
+          </p:cNvPr>
+          <p:cNvCxnSpPr>
+            <a:cxnSpLocks/>
+            <a:stCxn id="5" idx="3"/>
+            <a:endCxn id="7" idx="1"/>
+          </p:cNvCxnSpPr>
+          <p:nvPr/>
+        </p:nvCxnSpPr>
+        <p:spPr>
+          <a:xfrm flipV="1">
+            <a:off x="5893578" y="4380225"/>
+            <a:ext cx="1865814" cy="7760"/>
+          </a:xfrm>
+          <a:prstGeom prst="straightConnector1">
+            <a:avLst/>
+          </a:prstGeom>
+          <a:ln w="57150">
+            <a:headEnd type="triangle"/>
+            <a:tailEnd type="triangle"/>
+          </a:ln>
+        </p:spPr>
+        <p:style>
+          <a:lnRef idx="1">
+            <a:schemeClr val="accent5"/>
+          </a:lnRef>
+          <a:fillRef idx="0">
+            <a:schemeClr val="accent5"/>
+          </a:fillRef>
+          <a:effectRef idx="0">
+            <a:schemeClr val="accent5"/>
+          </a:effectRef>
+          <a:fontRef idx="minor">
+            <a:schemeClr val="tx1"/>
+          </a:fontRef>
+        </p:style>
+      </p:cxnSp>
     </p:spTree>
     <p:extLst>
       <p:ext uri="{BB962C8B-B14F-4D97-AF65-F5344CB8AC3E}">
@@ -2496,13 +3600,6 @@
   <p:clrMapOvr>
     <a:masterClrMapping/>
   </p:clrMapOvr>
-  <p:timing>
-    <p:tnLst>
-      <p:par>
-        <p:cTn xmlns:p14="http://schemas.microsoft.com/office/powerpoint/2010/main" id="1" dur="indefinite" restart="never" nodeType="tmRoot"/>
-      </p:par>
-    </p:tnLst>
-  </p:timing>
 </p:sld>
 </file>
 
@@ -2723,18 +3820,733 @@
           </a:lstStyle>
           <a:p>
             <a:r>
-              <a:rPr lang="fr-FR" sz="3600" dirty="0" smtClean="0">
+              <a:rPr lang="fr-FR" sz="3600" dirty="0">
+                <a:solidFill>
+                  <a:prstClr val="black"/>
+                </a:solidFill>
+              </a:rPr>
+              <a:t>2. Conception du compilateur </a:t>
+            </a:r>
+          </a:p>
+        </p:txBody>
+      </p:sp>
+    </p:spTree>
+    <p:extLst>
+      <p:ext uri="{BB962C8B-B14F-4D97-AF65-F5344CB8AC3E}">
+        <p14:creationId xmlns:p14="http://schemas.microsoft.com/office/powerpoint/2010/main" val="3182346554"/>
+      </p:ext>
+    </p:extLst>
+  </p:cSld>
+  <p:clrMapOvr>
+    <a:masterClrMapping/>
+  </p:clrMapOvr>
+</p:sld>
+</file>
+
+<file path=ppt/slides/slide6.xml><?xml version="1.0" encoding="utf-8"?>
+<p:sld xmlns:a="http://schemas.openxmlformats.org/drawingml/2006/main" xmlns:r="http://schemas.openxmlformats.org/officeDocument/2006/relationships" xmlns:p="http://schemas.openxmlformats.org/presentationml/2006/main">
+  <p:cSld>
+    <p:spTree>
+      <p:nvGrpSpPr>
+        <p:cNvPr id="1" name=""/>
+        <p:cNvGrpSpPr/>
+        <p:nvPr/>
+      </p:nvGrpSpPr>
+      <p:grpSpPr>
+        <a:xfrm>
+          <a:off x="0" y="0"/>
+          <a:ext cx="0" cy="0"/>
+          <a:chOff x="0" y="0"/>
+          <a:chExt cx="0" cy="0"/>
+        </a:xfrm>
+      </p:grpSpPr>
+      <p:sp>
+        <p:nvSpPr>
+          <p:cNvPr id="4" name="Espace réservé du texte 1"/>
+          <p:cNvSpPr txBox="1">
+            <a:spLocks/>
+          </p:cNvSpPr>
+          <p:nvPr/>
+        </p:nvSpPr>
+        <p:spPr>
+          <a:xfrm>
+            <a:off x="333935" y="522171"/>
+            <a:ext cx="7740198" cy="714359"/>
+          </a:xfrm>
+          <a:prstGeom prst="rect">
+            <a:avLst/>
+          </a:prstGeom>
+        </p:spPr>
+        <p:txBody>
+          <a:bodyPr/>
+          <a:lstStyle>
+            <a:lvl1pPr marL="228600" indent="-228600" algn="l" rtl="0" eaLnBrk="0" fontAlgn="base" hangingPunct="0">
+              <a:lnSpc>
+                <a:spcPct val="90000"/>
+              </a:lnSpc>
+              <a:spcBef>
+                <a:spcPts val="1000"/>
+              </a:spcBef>
+              <a:spcAft>
+                <a:spcPct val="0"/>
+              </a:spcAft>
+              <a:buFont typeface="Arial" panose="020B0604020202020204" pitchFamily="34" charset="0"/>
+              <a:buNone/>
+              <a:defRPr sz="4000" b="1" kern="1200">
+                <a:solidFill>
+                  <a:schemeClr val="tx1"/>
+                </a:solidFill>
+                <a:latin typeface="+mn-lt"/>
+                <a:ea typeface="+mn-ea"/>
+                <a:cs typeface="+mn-cs"/>
+              </a:defRPr>
+            </a:lvl1pPr>
+            <a:lvl2pPr marL="685800" indent="-228600" algn="l" rtl="0" eaLnBrk="0" fontAlgn="base" hangingPunct="0">
+              <a:lnSpc>
+                <a:spcPct val="90000"/>
+              </a:lnSpc>
+              <a:spcBef>
+                <a:spcPts val="500"/>
+              </a:spcBef>
+              <a:spcAft>
+                <a:spcPct val="0"/>
+              </a:spcAft>
+              <a:buFont typeface="Arial" panose="020B0604020202020204" pitchFamily="34" charset="0"/>
+              <a:buChar char="•"/>
+              <a:defRPr sz="2400" kern="1200">
+                <a:solidFill>
+                  <a:schemeClr val="tx1"/>
+                </a:solidFill>
+                <a:latin typeface="+mn-lt"/>
+                <a:ea typeface="+mn-ea"/>
+                <a:cs typeface="+mn-cs"/>
+              </a:defRPr>
+            </a:lvl2pPr>
+            <a:lvl3pPr marL="1143000" indent="-228600" algn="l" rtl="0" eaLnBrk="0" fontAlgn="base" hangingPunct="0">
+              <a:lnSpc>
+                <a:spcPct val="90000"/>
+              </a:lnSpc>
+              <a:spcBef>
+                <a:spcPts val="500"/>
+              </a:spcBef>
+              <a:spcAft>
+                <a:spcPct val="0"/>
+              </a:spcAft>
+              <a:buFont typeface="Arial" panose="020B0604020202020204" pitchFamily="34" charset="0"/>
+              <a:buChar char="•"/>
+              <a:defRPr sz="2000" kern="1200">
+                <a:solidFill>
+                  <a:schemeClr val="tx1"/>
+                </a:solidFill>
+                <a:latin typeface="+mn-lt"/>
+                <a:ea typeface="+mn-ea"/>
+                <a:cs typeface="+mn-cs"/>
+              </a:defRPr>
+            </a:lvl3pPr>
+            <a:lvl4pPr marL="1600200" indent="-228600" algn="l" rtl="0" eaLnBrk="0" fontAlgn="base" hangingPunct="0">
+              <a:lnSpc>
+                <a:spcPct val="90000"/>
+              </a:lnSpc>
+              <a:spcBef>
+                <a:spcPts val="500"/>
+              </a:spcBef>
+              <a:spcAft>
+                <a:spcPct val="0"/>
+              </a:spcAft>
+              <a:buFont typeface="Arial" panose="020B0604020202020204" pitchFamily="34" charset="0"/>
+              <a:buChar char="•"/>
+              <a:defRPr kern="1200">
+                <a:solidFill>
+                  <a:schemeClr val="tx1"/>
+                </a:solidFill>
+                <a:latin typeface="+mn-lt"/>
+                <a:ea typeface="+mn-ea"/>
+                <a:cs typeface="+mn-cs"/>
+              </a:defRPr>
+            </a:lvl4pPr>
+            <a:lvl5pPr marL="2057400" indent="-228600" algn="l" rtl="0" eaLnBrk="0" fontAlgn="base" hangingPunct="0">
+              <a:lnSpc>
+                <a:spcPct val="90000"/>
+              </a:lnSpc>
+              <a:spcBef>
+                <a:spcPts val="500"/>
+              </a:spcBef>
+              <a:spcAft>
+                <a:spcPct val="0"/>
+              </a:spcAft>
+              <a:buFont typeface="Arial" panose="020B0604020202020204" pitchFamily="34" charset="0"/>
+              <a:buChar char="•"/>
+              <a:defRPr kern="1200">
+                <a:solidFill>
+                  <a:schemeClr val="tx1"/>
+                </a:solidFill>
+                <a:latin typeface="+mn-lt"/>
+                <a:ea typeface="+mn-ea"/>
+                <a:cs typeface="+mn-cs"/>
+              </a:defRPr>
+            </a:lvl5pPr>
+            <a:lvl6pPr marL="2514600" indent="-228600" algn="l" defTabSz="914400" rtl="0" eaLnBrk="1" latinLnBrk="0" hangingPunct="1">
+              <a:lnSpc>
+                <a:spcPct val="90000"/>
+              </a:lnSpc>
+              <a:spcBef>
+                <a:spcPts val="500"/>
+              </a:spcBef>
+              <a:buFont typeface="Arial" panose="020B0604020202020204" pitchFamily="34" charset="0"/>
+              <a:buChar char="•"/>
+              <a:defRPr sz="1800" kern="1200">
+                <a:solidFill>
+                  <a:schemeClr val="tx1"/>
+                </a:solidFill>
+                <a:latin typeface="+mn-lt"/>
+                <a:ea typeface="+mn-ea"/>
+                <a:cs typeface="+mn-cs"/>
+              </a:defRPr>
+            </a:lvl6pPr>
+            <a:lvl7pPr marL="2971800" indent="-228600" algn="l" defTabSz="914400" rtl="0" eaLnBrk="1" latinLnBrk="0" hangingPunct="1">
+              <a:lnSpc>
+                <a:spcPct val="90000"/>
+              </a:lnSpc>
+              <a:spcBef>
+                <a:spcPts val="500"/>
+              </a:spcBef>
+              <a:buFont typeface="Arial" panose="020B0604020202020204" pitchFamily="34" charset="0"/>
+              <a:buChar char="•"/>
+              <a:defRPr sz="1800" kern="1200">
+                <a:solidFill>
+                  <a:schemeClr val="tx1"/>
+                </a:solidFill>
+                <a:latin typeface="+mn-lt"/>
+                <a:ea typeface="+mn-ea"/>
+                <a:cs typeface="+mn-cs"/>
+              </a:defRPr>
+            </a:lvl7pPr>
+            <a:lvl8pPr marL="3429000" indent="-228600" algn="l" defTabSz="914400" rtl="0" eaLnBrk="1" latinLnBrk="0" hangingPunct="1">
+              <a:lnSpc>
+                <a:spcPct val="90000"/>
+              </a:lnSpc>
+              <a:spcBef>
+                <a:spcPts val="500"/>
+              </a:spcBef>
+              <a:buFont typeface="Arial" panose="020B0604020202020204" pitchFamily="34" charset="0"/>
+              <a:buChar char="•"/>
+              <a:defRPr sz="1800" kern="1200">
+                <a:solidFill>
+                  <a:schemeClr val="tx1"/>
+                </a:solidFill>
+                <a:latin typeface="+mn-lt"/>
+                <a:ea typeface="+mn-ea"/>
+                <a:cs typeface="+mn-cs"/>
+              </a:defRPr>
+            </a:lvl8pPr>
+            <a:lvl9pPr marL="3886200" indent="-228600" algn="l" defTabSz="914400" rtl="0" eaLnBrk="1" latinLnBrk="0" hangingPunct="1">
+              <a:lnSpc>
+                <a:spcPct val="90000"/>
+              </a:lnSpc>
+              <a:spcBef>
+                <a:spcPts val="500"/>
+              </a:spcBef>
+              <a:buFont typeface="Arial" panose="020B0604020202020204" pitchFamily="34" charset="0"/>
+              <a:buChar char="•"/>
+              <a:defRPr sz="1800" kern="1200">
+                <a:solidFill>
+                  <a:schemeClr val="tx1"/>
+                </a:solidFill>
+                <a:latin typeface="+mn-lt"/>
+                <a:ea typeface="+mn-ea"/>
+                <a:cs typeface="+mn-cs"/>
+              </a:defRPr>
+            </a:lvl9pPr>
+          </a:lstStyle>
+          <a:p>
+            <a:r>
+              <a:rPr lang="fr-FR" sz="3600" dirty="0">
+                <a:solidFill>
+                  <a:prstClr val="black"/>
+                </a:solidFill>
+              </a:rPr>
+              <a:t>3. Management du projet</a:t>
+            </a:r>
+          </a:p>
+        </p:txBody>
+      </p:sp>
+    </p:spTree>
+    <p:extLst>
+      <p:ext uri="{BB962C8B-B14F-4D97-AF65-F5344CB8AC3E}">
+        <p14:creationId xmlns:p14="http://schemas.microsoft.com/office/powerpoint/2010/main" val="2538847414"/>
+      </p:ext>
+    </p:extLst>
+  </p:cSld>
+  <p:clrMapOvr>
+    <a:masterClrMapping/>
+  </p:clrMapOvr>
+</p:sld>
+</file>
+
+<file path=ppt/slides/slide7.xml><?xml version="1.0" encoding="utf-8"?>
+<p:sld xmlns:a="http://schemas.openxmlformats.org/drawingml/2006/main" xmlns:r="http://schemas.openxmlformats.org/officeDocument/2006/relationships" xmlns:p="http://schemas.openxmlformats.org/presentationml/2006/main">
+  <p:cSld>
+    <p:spTree>
+      <p:nvGrpSpPr>
+        <p:cNvPr id="1" name=""/>
+        <p:cNvGrpSpPr/>
+        <p:nvPr/>
+      </p:nvGrpSpPr>
+      <p:grpSpPr>
+        <a:xfrm>
+          <a:off x="0" y="0"/>
+          <a:ext cx="0" cy="0"/>
+          <a:chOff x="0" y="0"/>
+          <a:chExt cx="0" cy="0"/>
+        </a:xfrm>
+      </p:grpSpPr>
+      <p:sp>
+        <p:nvSpPr>
+          <p:cNvPr id="4" name="Espace réservé du texte 1"/>
+          <p:cNvSpPr txBox="1">
+            <a:spLocks/>
+          </p:cNvSpPr>
+          <p:nvPr/>
+        </p:nvSpPr>
+        <p:spPr>
+          <a:xfrm>
+            <a:off x="333935" y="522171"/>
+            <a:ext cx="7740198" cy="714359"/>
+          </a:xfrm>
+          <a:prstGeom prst="rect">
+            <a:avLst/>
+          </a:prstGeom>
+        </p:spPr>
+        <p:txBody>
+          <a:bodyPr/>
+          <a:lstStyle>
+            <a:lvl1pPr marL="228600" indent="-228600" algn="l" rtl="0" eaLnBrk="0" fontAlgn="base" hangingPunct="0">
+              <a:lnSpc>
+                <a:spcPct val="90000"/>
+              </a:lnSpc>
+              <a:spcBef>
+                <a:spcPts val="1000"/>
+              </a:spcBef>
+              <a:spcAft>
+                <a:spcPct val="0"/>
+              </a:spcAft>
+              <a:buFont typeface="Arial" panose="020B0604020202020204" pitchFamily="34" charset="0"/>
+              <a:buNone/>
+              <a:defRPr sz="4000" b="1" kern="1200">
+                <a:solidFill>
+                  <a:schemeClr val="tx1"/>
+                </a:solidFill>
+                <a:latin typeface="+mn-lt"/>
+                <a:ea typeface="+mn-ea"/>
+                <a:cs typeface="+mn-cs"/>
+              </a:defRPr>
+            </a:lvl1pPr>
+            <a:lvl2pPr marL="685800" indent="-228600" algn="l" rtl="0" eaLnBrk="0" fontAlgn="base" hangingPunct="0">
+              <a:lnSpc>
+                <a:spcPct val="90000"/>
+              </a:lnSpc>
+              <a:spcBef>
+                <a:spcPts val="500"/>
+              </a:spcBef>
+              <a:spcAft>
+                <a:spcPct val="0"/>
+              </a:spcAft>
+              <a:buFont typeface="Arial" panose="020B0604020202020204" pitchFamily="34" charset="0"/>
+              <a:buChar char="•"/>
+              <a:defRPr sz="2400" kern="1200">
+                <a:solidFill>
+                  <a:schemeClr val="tx1"/>
+                </a:solidFill>
+                <a:latin typeface="+mn-lt"/>
+                <a:ea typeface="+mn-ea"/>
+                <a:cs typeface="+mn-cs"/>
+              </a:defRPr>
+            </a:lvl2pPr>
+            <a:lvl3pPr marL="1143000" indent="-228600" algn="l" rtl="0" eaLnBrk="0" fontAlgn="base" hangingPunct="0">
+              <a:lnSpc>
+                <a:spcPct val="90000"/>
+              </a:lnSpc>
+              <a:spcBef>
+                <a:spcPts val="500"/>
+              </a:spcBef>
+              <a:spcAft>
+                <a:spcPct val="0"/>
+              </a:spcAft>
+              <a:buFont typeface="Arial" panose="020B0604020202020204" pitchFamily="34" charset="0"/>
+              <a:buChar char="•"/>
+              <a:defRPr sz="2000" kern="1200">
+                <a:solidFill>
+                  <a:schemeClr val="tx1"/>
+                </a:solidFill>
+                <a:latin typeface="+mn-lt"/>
+                <a:ea typeface="+mn-ea"/>
+                <a:cs typeface="+mn-cs"/>
+              </a:defRPr>
+            </a:lvl3pPr>
+            <a:lvl4pPr marL="1600200" indent="-228600" algn="l" rtl="0" eaLnBrk="0" fontAlgn="base" hangingPunct="0">
+              <a:lnSpc>
+                <a:spcPct val="90000"/>
+              </a:lnSpc>
+              <a:spcBef>
+                <a:spcPts val="500"/>
+              </a:spcBef>
+              <a:spcAft>
+                <a:spcPct val="0"/>
+              </a:spcAft>
+              <a:buFont typeface="Arial" panose="020B0604020202020204" pitchFamily="34" charset="0"/>
+              <a:buChar char="•"/>
+              <a:defRPr kern="1200">
+                <a:solidFill>
+                  <a:schemeClr val="tx1"/>
+                </a:solidFill>
+                <a:latin typeface="+mn-lt"/>
+                <a:ea typeface="+mn-ea"/>
+                <a:cs typeface="+mn-cs"/>
+              </a:defRPr>
+            </a:lvl4pPr>
+            <a:lvl5pPr marL="2057400" indent="-228600" algn="l" rtl="0" eaLnBrk="0" fontAlgn="base" hangingPunct="0">
+              <a:lnSpc>
+                <a:spcPct val="90000"/>
+              </a:lnSpc>
+              <a:spcBef>
+                <a:spcPts val="500"/>
+              </a:spcBef>
+              <a:spcAft>
+                <a:spcPct val="0"/>
+              </a:spcAft>
+              <a:buFont typeface="Arial" panose="020B0604020202020204" pitchFamily="34" charset="0"/>
+              <a:buChar char="•"/>
+              <a:defRPr kern="1200">
+                <a:solidFill>
+                  <a:schemeClr val="tx1"/>
+                </a:solidFill>
+                <a:latin typeface="+mn-lt"/>
+                <a:ea typeface="+mn-ea"/>
+                <a:cs typeface="+mn-cs"/>
+              </a:defRPr>
+            </a:lvl5pPr>
+            <a:lvl6pPr marL="2514600" indent="-228600" algn="l" defTabSz="914400" rtl="0" eaLnBrk="1" latinLnBrk="0" hangingPunct="1">
+              <a:lnSpc>
+                <a:spcPct val="90000"/>
+              </a:lnSpc>
+              <a:spcBef>
+                <a:spcPts val="500"/>
+              </a:spcBef>
+              <a:buFont typeface="Arial" panose="020B0604020202020204" pitchFamily="34" charset="0"/>
+              <a:buChar char="•"/>
+              <a:defRPr sz="1800" kern="1200">
+                <a:solidFill>
+                  <a:schemeClr val="tx1"/>
+                </a:solidFill>
+                <a:latin typeface="+mn-lt"/>
+                <a:ea typeface="+mn-ea"/>
+                <a:cs typeface="+mn-cs"/>
+              </a:defRPr>
+            </a:lvl6pPr>
+            <a:lvl7pPr marL="2971800" indent="-228600" algn="l" defTabSz="914400" rtl="0" eaLnBrk="1" latinLnBrk="0" hangingPunct="1">
+              <a:lnSpc>
+                <a:spcPct val="90000"/>
+              </a:lnSpc>
+              <a:spcBef>
+                <a:spcPts val="500"/>
+              </a:spcBef>
+              <a:buFont typeface="Arial" panose="020B0604020202020204" pitchFamily="34" charset="0"/>
+              <a:buChar char="•"/>
+              <a:defRPr sz="1800" kern="1200">
+                <a:solidFill>
+                  <a:schemeClr val="tx1"/>
+                </a:solidFill>
+                <a:latin typeface="+mn-lt"/>
+                <a:ea typeface="+mn-ea"/>
+                <a:cs typeface="+mn-cs"/>
+              </a:defRPr>
+            </a:lvl7pPr>
+            <a:lvl8pPr marL="3429000" indent="-228600" algn="l" defTabSz="914400" rtl="0" eaLnBrk="1" latinLnBrk="0" hangingPunct="1">
+              <a:lnSpc>
+                <a:spcPct val="90000"/>
+              </a:lnSpc>
+              <a:spcBef>
+                <a:spcPts val="500"/>
+              </a:spcBef>
+              <a:buFont typeface="Arial" panose="020B0604020202020204" pitchFamily="34" charset="0"/>
+              <a:buChar char="•"/>
+              <a:defRPr sz="1800" kern="1200">
+                <a:solidFill>
+                  <a:schemeClr val="tx1"/>
+                </a:solidFill>
+                <a:latin typeface="+mn-lt"/>
+                <a:ea typeface="+mn-ea"/>
+                <a:cs typeface="+mn-cs"/>
+              </a:defRPr>
+            </a:lvl8pPr>
+            <a:lvl9pPr marL="3886200" indent="-228600" algn="l" defTabSz="914400" rtl="0" eaLnBrk="1" latinLnBrk="0" hangingPunct="1">
+              <a:lnSpc>
+                <a:spcPct val="90000"/>
+              </a:lnSpc>
+              <a:spcBef>
+                <a:spcPts val="500"/>
+              </a:spcBef>
+              <a:buFont typeface="Arial" panose="020B0604020202020204" pitchFamily="34" charset="0"/>
+              <a:buChar char="•"/>
+              <a:defRPr sz="1800" kern="1200">
+                <a:solidFill>
+                  <a:schemeClr val="tx1"/>
+                </a:solidFill>
+                <a:latin typeface="+mn-lt"/>
+                <a:ea typeface="+mn-ea"/>
+                <a:cs typeface="+mn-cs"/>
+              </a:defRPr>
+            </a:lvl9pPr>
+          </a:lstStyle>
+          <a:p>
+            <a:r>
+              <a:rPr lang="fr-FR" sz="3600" dirty="0">
+                <a:solidFill>
+                  <a:prstClr val="black"/>
+                </a:solidFill>
+              </a:rPr>
+              <a:t>Conclusion</a:t>
+            </a:r>
+          </a:p>
+        </p:txBody>
+      </p:sp>
+    </p:spTree>
+    <p:extLst>
+      <p:ext uri="{BB962C8B-B14F-4D97-AF65-F5344CB8AC3E}">
+        <p14:creationId xmlns:p14="http://schemas.microsoft.com/office/powerpoint/2010/main" val="3692165290"/>
+      </p:ext>
+    </p:extLst>
+  </p:cSld>
+  <p:clrMapOvr>
+    <a:masterClrMapping/>
+  </p:clrMapOvr>
+</p:sld>
+</file>
+
+<file path=ppt/slides/slide8.xml><?xml version="1.0" encoding="utf-8"?>
+<p:sld xmlns:a="http://schemas.openxmlformats.org/drawingml/2006/main" xmlns:r="http://schemas.openxmlformats.org/officeDocument/2006/relationships" xmlns:p="http://schemas.openxmlformats.org/presentationml/2006/main">
+  <p:cSld>
+    <p:spTree>
+      <p:nvGrpSpPr>
+        <p:cNvPr id="1" name=""/>
+        <p:cNvGrpSpPr/>
+        <p:nvPr/>
+      </p:nvGrpSpPr>
+      <p:grpSpPr>
+        <a:xfrm>
+          <a:off x="0" y="0"/>
+          <a:ext cx="0" cy="0"/>
+          <a:chOff x="0" y="0"/>
+          <a:chExt cx="0" cy="0"/>
+        </a:xfrm>
+      </p:grpSpPr>
+      <p:sp>
+        <p:nvSpPr>
+          <p:cNvPr id="4" name="Espace réservé du texte 1"/>
+          <p:cNvSpPr txBox="1">
+            <a:spLocks/>
+          </p:cNvSpPr>
+          <p:nvPr/>
+        </p:nvSpPr>
+        <p:spPr>
+          <a:xfrm>
+            <a:off x="333935" y="522171"/>
+            <a:ext cx="7740198" cy="714359"/>
+          </a:xfrm>
+          <a:prstGeom prst="rect">
+            <a:avLst/>
+          </a:prstGeom>
+        </p:spPr>
+        <p:txBody>
+          <a:bodyPr/>
+          <a:lstStyle>
+            <a:lvl1pPr marL="228600" indent="-228600" algn="l" rtl="0" eaLnBrk="0" fontAlgn="base" hangingPunct="0">
+              <a:lnSpc>
+                <a:spcPct val="90000"/>
+              </a:lnSpc>
+              <a:spcBef>
+                <a:spcPts val="1000"/>
+              </a:spcBef>
+              <a:spcAft>
+                <a:spcPct val="0"/>
+              </a:spcAft>
+              <a:buFont typeface="Arial" panose="020B0604020202020204" pitchFamily="34" charset="0"/>
+              <a:buNone/>
+              <a:defRPr sz="4000" b="1" kern="1200">
+                <a:solidFill>
+                  <a:schemeClr val="tx1"/>
+                </a:solidFill>
+                <a:latin typeface="+mn-lt"/>
+                <a:ea typeface="+mn-ea"/>
+                <a:cs typeface="+mn-cs"/>
+              </a:defRPr>
+            </a:lvl1pPr>
+            <a:lvl2pPr marL="685800" indent="-228600" algn="l" rtl="0" eaLnBrk="0" fontAlgn="base" hangingPunct="0">
+              <a:lnSpc>
+                <a:spcPct val="90000"/>
+              </a:lnSpc>
+              <a:spcBef>
+                <a:spcPts val="500"/>
+              </a:spcBef>
+              <a:spcAft>
+                <a:spcPct val="0"/>
+              </a:spcAft>
+              <a:buFont typeface="Arial" panose="020B0604020202020204" pitchFamily="34" charset="0"/>
+              <a:buChar char="•"/>
+              <a:defRPr sz="2400" kern="1200">
+                <a:solidFill>
+                  <a:schemeClr val="tx1"/>
+                </a:solidFill>
+                <a:latin typeface="+mn-lt"/>
+                <a:ea typeface="+mn-ea"/>
+                <a:cs typeface="+mn-cs"/>
+              </a:defRPr>
+            </a:lvl2pPr>
+            <a:lvl3pPr marL="1143000" indent="-228600" algn="l" rtl="0" eaLnBrk="0" fontAlgn="base" hangingPunct="0">
+              <a:lnSpc>
+                <a:spcPct val="90000"/>
+              </a:lnSpc>
+              <a:spcBef>
+                <a:spcPts val="500"/>
+              </a:spcBef>
+              <a:spcAft>
+                <a:spcPct val="0"/>
+              </a:spcAft>
+              <a:buFont typeface="Arial" panose="020B0604020202020204" pitchFamily="34" charset="0"/>
+              <a:buChar char="•"/>
+              <a:defRPr sz="2000" kern="1200">
+                <a:solidFill>
+                  <a:schemeClr val="tx1"/>
+                </a:solidFill>
+                <a:latin typeface="+mn-lt"/>
+                <a:ea typeface="+mn-ea"/>
+                <a:cs typeface="+mn-cs"/>
+              </a:defRPr>
+            </a:lvl3pPr>
+            <a:lvl4pPr marL="1600200" indent="-228600" algn="l" rtl="0" eaLnBrk="0" fontAlgn="base" hangingPunct="0">
+              <a:lnSpc>
+                <a:spcPct val="90000"/>
+              </a:lnSpc>
+              <a:spcBef>
+                <a:spcPts val="500"/>
+              </a:spcBef>
+              <a:spcAft>
+                <a:spcPct val="0"/>
+              </a:spcAft>
+              <a:buFont typeface="Arial" panose="020B0604020202020204" pitchFamily="34" charset="0"/>
+              <a:buChar char="•"/>
+              <a:defRPr kern="1200">
+                <a:solidFill>
+                  <a:schemeClr val="tx1"/>
+                </a:solidFill>
+                <a:latin typeface="+mn-lt"/>
+                <a:ea typeface="+mn-ea"/>
+                <a:cs typeface="+mn-cs"/>
+              </a:defRPr>
+            </a:lvl4pPr>
+            <a:lvl5pPr marL="2057400" indent="-228600" algn="l" rtl="0" eaLnBrk="0" fontAlgn="base" hangingPunct="0">
+              <a:lnSpc>
+                <a:spcPct val="90000"/>
+              </a:lnSpc>
+              <a:spcBef>
+                <a:spcPts val="500"/>
+              </a:spcBef>
+              <a:spcAft>
+                <a:spcPct val="0"/>
+              </a:spcAft>
+              <a:buFont typeface="Arial" panose="020B0604020202020204" pitchFamily="34" charset="0"/>
+              <a:buChar char="•"/>
+              <a:defRPr kern="1200">
+                <a:solidFill>
+                  <a:schemeClr val="tx1"/>
+                </a:solidFill>
+                <a:latin typeface="+mn-lt"/>
+                <a:ea typeface="+mn-ea"/>
+                <a:cs typeface="+mn-cs"/>
+              </a:defRPr>
+            </a:lvl5pPr>
+            <a:lvl6pPr marL="2514600" indent="-228600" algn="l" defTabSz="914400" rtl="0" eaLnBrk="1" latinLnBrk="0" hangingPunct="1">
+              <a:lnSpc>
+                <a:spcPct val="90000"/>
+              </a:lnSpc>
+              <a:spcBef>
+                <a:spcPts val="500"/>
+              </a:spcBef>
+              <a:buFont typeface="Arial" panose="020B0604020202020204" pitchFamily="34" charset="0"/>
+              <a:buChar char="•"/>
+              <a:defRPr sz="1800" kern="1200">
+                <a:solidFill>
+                  <a:schemeClr val="tx1"/>
+                </a:solidFill>
+                <a:latin typeface="+mn-lt"/>
+                <a:ea typeface="+mn-ea"/>
+                <a:cs typeface="+mn-cs"/>
+              </a:defRPr>
+            </a:lvl6pPr>
+            <a:lvl7pPr marL="2971800" indent="-228600" algn="l" defTabSz="914400" rtl="0" eaLnBrk="1" latinLnBrk="0" hangingPunct="1">
+              <a:lnSpc>
+                <a:spcPct val="90000"/>
+              </a:lnSpc>
+              <a:spcBef>
+                <a:spcPts val="500"/>
+              </a:spcBef>
+              <a:buFont typeface="Arial" panose="020B0604020202020204" pitchFamily="34" charset="0"/>
+              <a:buChar char="•"/>
+              <a:defRPr sz="1800" kern="1200">
+                <a:solidFill>
+                  <a:schemeClr val="tx1"/>
+                </a:solidFill>
+                <a:latin typeface="+mn-lt"/>
+                <a:ea typeface="+mn-ea"/>
+                <a:cs typeface="+mn-cs"/>
+              </a:defRPr>
+            </a:lvl7pPr>
+            <a:lvl8pPr marL="3429000" indent="-228600" algn="l" defTabSz="914400" rtl="0" eaLnBrk="1" latinLnBrk="0" hangingPunct="1">
+              <a:lnSpc>
+                <a:spcPct val="90000"/>
+              </a:lnSpc>
+              <a:spcBef>
+                <a:spcPts val="500"/>
+              </a:spcBef>
+              <a:buFont typeface="Arial" panose="020B0604020202020204" pitchFamily="34" charset="0"/>
+              <a:buChar char="•"/>
+              <a:defRPr sz="1800" kern="1200">
+                <a:solidFill>
+                  <a:schemeClr val="tx1"/>
+                </a:solidFill>
+                <a:latin typeface="+mn-lt"/>
+                <a:ea typeface="+mn-ea"/>
+                <a:cs typeface="+mn-cs"/>
+              </a:defRPr>
+            </a:lvl8pPr>
+            <a:lvl9pPr marL="3886200" indent="-228600" algn="l" defTabSz="914400" rtl="0" eaLnBrk="1" latinLnBrk="0" hangingPunct="1">
+              <a:lnSpc>
+                <a:spcPct val="90000"/>
+              </a:lnSpc>
+              <a:spcBef>
+                <a:spcPts val="500"/>
+              </a:spcBef>
+              <a:buFont typeface="Arial" panose="020B0604020202020204" pitchFamily="34" charset="0"/>
+              <a:buChar char="•"/>
+              <a:defRPr sz="1800" kern="1200">
+                <a:solidFill>
+                  <a:schemeClr val="tx1"/>
+                </a:solidFill>
+                <a:latin typeface="+mn-lt"/>
+                <a:ea typeface="+mn-ea"/>
+                <a:cs typeface="+mn-cs"/>
+              </a:defRPr>
+            </a:lvl9pPr>
+          </a:lstStyle>
+          <a:p>
+            <a:r>
+              <a:rPr lang="fr-FR" sz="3600" dirty="0">
                 <a:solidFill>
                   <a:prstClr val="black"/>
                 </a:solidFill>
               </a:rPr>
               <a:t>Merci pour votre attention</a:t>
             </a:r>
-            <a:endParaRPr lang="fr-FR" sz="3600" dirty="0">
-              <a:solidFill>
-                <a:prstClr val="black"/>
-              </a:solidFill>
-            </a:endParaRPr>
           </a:p>
         </p:txBody>
       </p:sp>
@@ -2746,7 +4558,7 @@
         </p:nvSpPr>
         <p:spPr>
           <a:xfrm>
-            <a:off x="2474435" y="2389118"/>
+            <a:off x="2604899" y="1745186"/>
             <a:ext cx="3510335" cy="600164"/>
           </a:xfrm>
           <a:prstGeom prst="rect">
@@ -2881,6 +4693,44 @@
           </a:p>
         </p:txBody>
       </p:sp>
+      <p:pic>
+        <p:nvPicPr>
+          <p:cNvPr id="3" name="Screen Recording 2019-03-07 at 20.26.40">
+            <a:hlinkClick r:id="" action="ppaction://media"/>
+            <a:extLst>
+              <a:ext uri="{FF2B5EF4-FFF2-40B4-BE49-F238E27FC236}">
+                <a16:creationId xmlns:a16="http://schemas.microsoft.com/office/drawing/2014/main" id="{FD099905-67AE-7C4D-8365-F7563CB6663D}"/>
+              </a:ext>
+            </a:extLst>
+          </p:cNvPr>
+          <p:cNvPicPr>
+            <a:picLocks noChangeAspect="1"/>
+          </p:cNvPicPr>
+          <p:nvPr>
+            <a:videoFile r:link="rId2"/>
+            <p:extLst>
+              <p:ext uri="{DAA4B4D4-6D71-4841-9C94-3DE7FCFB9230}">
+                <p14:media xmlns:p14="http://schemas.microsoft.com/office/powerpoint/2010/main" r:embed="rId1"/>
+              </p:ext>
+            </p:extLst>
+          </p:nvPr>
+        </p:nvPicPr>
+        <p:blipFill>
+          <a:blip r:embed="rId5"/>
+          <a:stretch>
+            <a:fillRect/>
+          </a:stretch>
+        </p:blipFill>
+        <p:spPr>
+          <a:xfrm>
+            <a:off x="2110086" y="2655224"/>
+            <a:ext cx="4187895" cy="3182358"/>
+          </a:xfrm>
+          <a:prstGeom prst="rect">
+            <a:avLst/>
+          </a:prstGeom>
+        </p:spPr>
+      </p:pic>
     </p:spTree>
     <p:extLst>
       <p:ext uri="{BB962C8B-B14F-4D97-AF65-F5344CB8AC3E}">
@@ -2894,7 +4744,80 @@
   <p:timing>
     <p:tnLst>
       <p:par>
-        <p:cTn xmlns:p14="http://schemas.microsoft.com/office/powerpoint/2010/main" id="1" dur="indefinite" restart="never" nodeType="tmRoot"/>
+        <p:cTn id="1" dur="indefinite" restart="never" nodeType="tmRoot">
+          <p:childTnLst>
+            <p:seq concurrent="1" nextAc="seek">
+              <p:cTn id="2" dur="indefinite" nodeType="mainSeq">
+                <p:childTnLst>
+                  <p:par>
+                    <p:cTn id="3" fill="hold">
+                      <p:stCondLst>
+                        <p:cond delay="indefinite"/>
+                        <p:cond evt="onBegin" delay="0">
+                          <p:tn val="2"/>
+                        </p:cond>
+                      </p:stCondLst>
+                      <p:childTnLst>
+                        <p:par>
+                          <p:cTn id="4" fill="hold">
+                            <p:stCondLst>
+                              <p:cond delay="0"/>
+                            </p:stCondLst>
+                            <p:childTnLst>
+                              <p:par>
+                                <p:cTn id="5" presetID="1" presetClass="mediacall" presetSubtype="0" fill="hold" nodeType="withEffect">
+                                  <p:stCondLst>
+                                    <p:cond delay="0"/>
+                                  </p:stCondLst>
+                                  <p:childTnLst>
+                                    <p:cmd type="call" cmd="playFrom(0.0)">
+                                      <p:cBhvr>
+                                        <p:cTn id="6" dur="1" fill="hold"/>
+                                        <p:tgtEl>
+                                          <p:spTgt spid="3"/>
+                                        </p:tgtEl>
+                                      </p:cBhvr>
+                                    </p:cmd>
+                                  </p:childTnLst>
+                                </p:cTn>
+                              </p:par>
+                            </p:childTnLst>
+                          </p:cTn>
+                        </p:par>
+                      </p:childTnLst>
+                    </p:cTn>
+                  </p:par>
+                </p:childTnLst>
+              </p:cTn>
+              <p:prevCondLst>
+                <p:cond evt="onPrev" delay="0">
+                  <p:tgtEl>
+                    <p:sldTgt/>
+                  </p:tgtEl>
+                </p:cond>
+              </p:prevCondLst>
+              <p:nextCondLst>
+                <p:cond evt="onNext" delay="0">
+                  <p:tgtEl>
+                    <p:sldTgt/>
+                  </p:tgtEl>
+                </p:cond>
+              </p:nextCondLst>
+            </p:seq>
+            <p:video>
+              <p:cMediaNode vol="80000">
+                <p:cTn id="7" repeatCount="indefinite" fill="hold" display="0">
+                  <p:stCondLst>
+                    <p:cond delay="indefinite"/>
+                  </p:stCondLst>
+                </p:cTn>
+                <p:tgtEl>
+                  <p:spTgt spid="3"/>
+                </p:tgtEl>
+              </p:cMediaNode>
+            </p:video>
+          </p:childTnLst>
+        </p:cTn>
       </p:par>
     </p:tnLst>
   </p:timing>
@@ -3156,7 +5079,7 @@
   <a:extraClrSchemeLst/>
   <a:extLst>
     <a:ext uri="{05A4C25C-085E-4340-85A3-A5531E510DB2}">
-      <thm15:themeFamily xmlns="" xmlns:thm15="http://schemas.microsoft.com/office/thememl/2012/main" name="Office Theme" id="{62F939B6-93AF-4DB8-9C6B-D6C7DFDC589F}" vid="{4A3C46E8-61CC-4603-A589-7422A47A8E4A}"/>
+      <thm15:themeFamily xmlns:thm15="http://schemas.microsoft.com/office/thememl/2012/main" name="Office Theme" id="{62F939B6-93AF-4DB8-9C6B-D6C7DFDC589F}" vid="{4A3C46E8-61CC-4603-A589-7422A47A8E4A}"/>
     </a:ext>
   </a:extLst>
 </a:theme>
@@ -3417,7 +5340,7 @@
   <a:extraClrSchemeLst/>
   <a:extLst>
     <a:ext uri="{05A4C25C-085E-4340-85A3-A5531E510DB2}">
-      <thm15:themeFamily xmlns="" xmlns:thm15="http://schemas.microsoft.com/office/thememl/2012/main" name="Office Theme" id="{62F939B6-93AF-4DB8-9C6B-D6C7DFDC589F}" vid="{4A3C46E8-61CC-4603-A589-7422A47A8E4A}"/>
+      <thm15:themeFamily xmlns:thm15="http://schemas.microsoft.com/office/thememl/2012/main" name="Office Theme" id="{62F939B6-93AF-4DB8-9C6B-D6C7DFDC589F}" vid="{4A3C46E8-61CC-4603-A589-7422A47A8E4A}"/>
     </a:ext>
   </a:extLst>
 </a:theme>

</xml_diff>